<commit_message>
Adapter Pattern Referat-Überarbeitete Version
</commit_message>
<xml_diff>
--- a/Adapter Pattern Referat/Adapter Design Pattern.pptx
+++ b/Adapter Pattern Referat/Adapter Design Pattern.pptx
@@ -5,27 +5,30 @@
     <p:sldMasterId id="2147483684" r:id="rId1"/>
   </p:sldMasterIdLst>
   <p:notesMasterIdLst>
-    <p:notesMasterId r:id="rId17"/>
+    <p:notesMasterId r:id="rId20"/>
   </p:notesMasterIdLst>
   <p:handoutMasterIdLst>
-    <p:handoutMasterId r:id="rId18"/>
+    <p:handoutMasterId r:id="rId21"/>
   </p:handoutMasterIdLst>
   <p:sldIdLst>
     <p:sldId id="256" r:id="rId2"/>
     <p:sldId id="257" r:id="rId3"/>
     <p:sldId id="264" r:id="rId4"/>
     <p:sldId id="265" r:id="rId5"/>
-    <p:sldId id="259" r:id="rId6"/>
-    <p:sldId id="262" r:id="rId7"/>
-    <p:sldId id="266" r:id="rId8"/>
-    <p:sldId id="267" r:id="rId9"/>
-    <p:sldId id="268" r:id="rId10"/>
-    <p:sldId id="269" r:id="rId11"/>
-    <p:sldId id="270" r:id="rId12"/>
-    <p:sldId id="271" r:id="rId13"/>
-    <p:sldId id="260" r:id="rId14"/>
-    <p:sldId id="272" r:id="rId15"/>
-    <p:sldId id="261" r:id="rId16"/>
+    <p:sldId id="273" r:id="rId6"/>
+    <p:sldId id="274" r:id="rId7"/>
+    <p:sldId id="275" r:id="rId8"/>
+    <p:sldId id="259" r:id="rId9"/>
+    <p:sldId id="262" r:id="rId10"/>
+    <p:sldId id="266" r:id="rId11"/>
+    <p:sldId id="267" r:id="rId12"/>
+    <p:sldId id="268" r:id="rId13"/>
+    <p:sldId id="269" r:id="rId14"/>
+    <p:sldId id="270" r:id="rId15"/>
+    <p:sldId id="271" r:id="rId16"/>
+    <p:sldId id="260" r:id="rId17"/>
+    <p:sldId id="272" r:id="rId18"/>
+    <p:sldId id="261" r:id="rId19"/>
   </p:sldIdLst>
   <p:sldSz cx="9144000" cy="6858000" type="screen4x3"/>
   <p:notesSz cx="6858000" cy="9144000"/>
@@ -132,6 +135,10 @@
 </p:presentation>
 </file>
 
+<file path=ppt/revisionInfo.xml><?xml version="1.0" encoding="utf-8"?>
+<p1510:revInfo xmlns:a="http://schemas.openxmlformats.org/drawingml/2006/main" xmlns:r="http://schemas.openxmlformats.org/officeDocument/2006/relationships" xmlns:p1510="http://schemas.microsoft.com/office/powerpoint/2015/10/main"/>
+</file>
+
 <file path=ppt/handoutMasters/handoutMaster1.xml><?xml version="1.0" encoding="utf-8"?>
 <p:handoutMaster xmlns:a="http://schemas.openxmlformats.org/drawingml/2006/main" xmlns:r="http://schemas.openxmlformats.org/officeDocument/2006/relationships" xmlns:p="http://schemas.openxmlformats.org/presentationml/2006/main">
   <p:cSld>
@@ -226,7 +233,7 @@
           <a:p>
             <a:fld id="{D7BB3903-6638-4C5E-8C2B-FD2C9DB2A642}" type="datetimeFigureOut">
               <a:rPr lang="en-GB" smtClean="0"/>
-              <a:t>15/11/2017</a:t>
+              <a:t>19/11/2017</a:t>
             </a:fld>
             <a:endParaRPr lang="en-GB"/>
           </a:p>
@@ -404,7 +411,7 @@
           <a:p>
             <a:fld id="{3A76DF93-A4D5-4BF8-BB96-449CB58CE51D}" type="datetimeFigureOut">
               <a:rPr lang="en-GB" smtClean="0"/>
-              <a:t>15/11/2017</a:t>
+              <a:t>19/11/2017</a:t>
             </a:fld>
             <a:endParaRPr lang="en-GB"/>
           </a:p>
@@ -3146,7 +3153,7 @@
           <a:p>
             <a:fld id="{C4CCC1E7-0B91-4ABD-B274-7F4A298A1711}" type="datetime1">
               <a:rPr lang="de-AT" smtClean="0"/>
-              <a:t>15.11.2017</a:t>
+              <a:t>19.11.2017</a:t>
             </a:fld>
             <a:endParaRPr lang="en-GB" dirty="0"/>
           </a:p>
@@ -3406,7 +3413,7 @@
           <a:p>
             <a:fld id="{A5E684A4-19FD-4855-9BA1-F1D155FFCB50}" type="datetime1">
               <a:rPr lang="de-AT" smtClean="0"/>
-              <a:t>15.11.2017</a:t>
+              <a:t>19.11.2017</a:t>
             </a:fld>
             <a:endParaRPr lang="en-GB"/>
           </a:p>
@@ -3539,7 +3546,7 @@
           <a:p>
             <a:fld id="{4885B502-9F1D-4B72-B706-32E149A9608A}" type="datetime1">
               <a:rPr lang="de-AT" smtClean="0"/>
-              <a:t>15.11.2017</a:t>
+              <a:t>19.11.2017</a:t>
             </a:fld>
             <a:endParaRPr lang="en-GB" dirty="0"/>
           </a:p>
@@ -3850,7 +3857,7 @@
           <a:p>
             <a:fld id="{C6AAF3EF-A190-4F36-B438-0D2057303B3A}" type="datetime1">
               <a:rPr lang="de-AT" smtClean="0"/>
-              <a:t>15.11.2017</a:t>
+              <a:t>19.11.2017</a:t>
             </a:fld>
             <a:endParaRPr lang="en-GB"/>
           </a:p>
@@ -3954,7 +3961,7 @@
           <a:p>
             <a:fld id="{D5F45C68-8119-4890-A243-F994706B36D6}" type="datetime1">
               <a:rPr lang="de-AT" smtClean="0"/>
-              <a:t>15.11.2017</a:t>
+              <a:t>19.11.2017</a:t>
             </a:fld>
             <a:endParaRPr lang="en-GB" dirty="0"/>
           </a:p>
@@ -4374,7 +4381,7 @@
           <a:p>
             <a:fld id="{71E33593-A42C-4932-9C8F-FFDF3EC0AE31}" type="datetime1">
               <a:rPr lang="de-AT" smtClean="0"/>
-              <a:t>15.11.2017</a:t>
+              <a:t>19.11.2017</a:t>
             </a:fld>
             <a:endParaRPr lang="en-GB"/>
           </a:p>
@@ -4641,7 +4648,7 @@
           <a:p>
             <a:fld id="{A3B79487-EF0A-4D72-8DC3-E1F4878DADA9}" type="datetime1">
               <a:rPr lang="de-AT" smtClean="0"/>
-              <a:t>15.11.2017</a:t>
+              <a:t>19.11.2017</a:t>
             </a:fld>
             <a:endParaRPr lang="en-GB"/>
           </a:p>
@@ -5043,7 +5050,7 @@
           <a:p>
             <a:fld id="{4BA2B110-E721-46C1-9267-E4A25B132A3E}" type="datetime1">
               <a:rPr lang="de-AT" smtClean="0"/>
-              <a:t>15.11.2017</a:t>
+              <a:t>19.11.2017</a:t>
             </a:fld>
             <a:endParaRPr lang="en-GB"/>
           </a:p>
@@ -5164,7 +5171,7 @@
           <a:p>
             <a:fld id="{82DF4458-0B94-415C-B513-EF078308B517}" type="datetime1">
               <a:rPr lang="de-AT" smtClean="0"/>
-              <a:t>15.11.2017</a:t>
+              <a:t>19.11.2017</a:t>
             </a:fld>
             <a:endParaRPr lang="en-GB"/>
           </a:p>
@@ -5262,7 +5269,7 @@
           <a:p>
             <a:fld id="{7A054B8C-EECC-4C6F-BCD4-949C60E889BC}" type="datetime1">
               <a:rPr lang="de-AT" smtClean="0"/>
-              <a:t>15.11.2017</a:t>
+              <a:t>19.11.2017</a:t>
             </a:fld>
             <a:endParaRPr lang="en-GB"/>
           </a:p>
@@ -5542,7 +5549,7 @@
           <a:p>
             <a:fld id="{1411B4E8-5150-40A2-8FC9-A290769F7D78}" type="datetime1">
               <a:rPr lang="de-AT" smtClean="0"/>
-              <a:t>15.11.2017</a:t>
+              <a:t>19.11.2017</a:t>
             </a:fld>
             <a:endParaRPr lang="en-GB"/>
           </a:p>
@@ -6903,7 +6910,7 @@
           <a:p>
             <a:fld id="{7046CDAA-FD1D-4683-AF70-1633582DA42D}" type="datetime1">
               <a:rPr lang="de-AT" smtClean="0"/>
-              <a:t>15.11.2017</a:t>
+              <a:t>19.11.2017</a:t>
             </a:fld>
             <a:endParaRPr lang="en-GB" dirty="0"/>
           </a:p>
@@ -8549,7 +8556,7 @@
           <a:p>
             <a:fld id="{9CDCFCAF-D667-4D9A-9C54-D5FD5656CE5F}" type="datetime1">
               <a:rPr lang="de-AT" smtClean="0"/>
-              <a:t>15.11.2017</a:t>
+              <a:t>19.11.2017</a:t>
             </a:fld>
             <a:endParaRPr lang="en-GB"/>
           </a:p>
@@ -8647,6 +8654,498 @@
           <p:cNvPr id="2" name="Datumsplatzhalter 1">
             <a:extLst>
               <a:ext uri="{FF2B5EF4-FFF2-40B4-BE49-F238E27FC236}">
+                <a16:creationId xmlns:a16="http://schemas.microsoft.com/office/drawing/2014/main" id="{F34B80F7-DA4F-410B-8853-9359F0913269}"/>
+              </a:ext>
+            </a:extLst>
+          </p:cNvPr>
+          <p:cNvSpPr>
+            <a:spLocks noGrp="1"/>
+          </p:cNvSpPr>
+          <p:nvPr>
+            <p:ph type="dt" sz="half" idx="10"/>
+          </p:nvPr>
+        </p:nvSpPr>
+        <p:spPr/>
+        <p:txBody>
+          <a:bodyPr/>
+          <a:lstStyle/>
+          <a:p>
+            <a:fld id="{7A054B8C-EECC-4C6F-BCD4-949C60E889BC}" type="datetime1">
+              <a:rPr lang="de-AT" smtClean="0"/>
+              <a:t>19.11.2017</a:t>
+            </a:fld>
+            <a:endParaRPr lang="en-GB"/>
+          </a:p>
+        </p:txBody>
+      </p:sp>
+      <p:sp>
+        <p:nvSpPr>
+          <p:cNvPr id="3" name="Fußzeilenplatzhalter 2">
+            <a:extLst>
+              <a:ext uri="{FF2B5EF4-FFF2-40B4-BE49-F238E27FC236}">
+                <a16:creationId xmlns:a16="http://schemas.microsoft.com/office/drawing/2014/main" id="{8706E88D-BC8D-4082-80C7-EF2F63D3D416}"/>
+              </a:ext>
+            </a:extLst>
+          </p:cNvPr>
+          <p:cNvSpPr>
+            <a:spLocks noGrp="1"/>
+          </p:cNvSpPr>
+          <p:nvPr>
+            <p:ph type="ftr" sz="quarter" idx="11"/>
+          </p:nvPr>
+        </p:nvSpPr>
+        <p:spPr/>
+        <p:txBody>
+          <a:bodyPr/>
+          <a:lstStyle/>
+          <a:p>
+            <a:r>
+              <a:rPr lang="en-GB"/>
+              <a:t>SEW</a:t>
+            </a:r>
+          </a:p>
+        </p:txBody>
+      </p:sp>
+      <p:sp>
+        <p:nvSpPr>
+          <p:cNvPr id="4" name="Foliennummernplatzhalter 3">
+            <a:extLst>
+              <a:ext uri="{FF2B5EF4-FFF2-40B4-BE49-F238E27FC236}">
+                <a16:creationId xmlns:a16="http://schemas.microsoft.com/office/drawing/2014/main" id="{C970BFFB-78DC-4983-BEA3-0875CDAB0FAE}"/>
+              </a:ext>
+            </a:extLst>
+          </p:cNvPr>
+          <p:cNvSpPr>
+            <a:spLocks noGrp="1"/>
+          </p:cNvSpPr>
+          <p:nvPr>
+            <p:ph type="sldNum" sz="quarter" idx="12"/>
+          </p:nvPr>
+        </p:nvSpPr>
+        <p:spPr/>
+        <p:txBody>
+          <a:bodyPr/>
+          <a:lstStyle/>
+          <a:p>
+            <a:fld id="{305D84B3-2E1E-4142-BA10-D488A77DA32F}" type="slidenum">
+              <a:rPr lang="en-GB" smtClean="0"/>
+              <a:t>10</a:t>
+            </a:fld>
+            <a:endParaRPr lang="en-GB"/>
+          </a:p>
+        </p:txBody>
+      </p:sp>
+      <p:pic>
+        <p:nvPicPr>
+          <p:cNvPr id="6" name="Grafik 5">
+            <a:extLst>
+              <a:ext uri="{FF2B5EF4-FFF2-40B4-BE49-F238E27FC236}">
+                <a16:creationId xmlns:a16="http://schemas.microsoft.com/office/drawing/2014/main" id="{4B36DC9D-DB5C-42CD-9B7F-628189256C0F}"/>
+              </a:ext>
+            </a:extLst>
+          </p:cNvPr>
+          <p:cNvPicPr>
+            <a:picLocks noChangeAspect="1"/>
+          </p:cNvPicPr>
+          <p:nvPr/>
+        </p:nvPicPr>
+        <p:blipFill>
+          <a:blip r:embed="rId2">
+            <a:extLst>
+              <a:ext uri="{28A0092B-C50C-407E-A947-70E740481C1C}">
+                <a14:useLocalDpi xmlns:a14="http://schemas.microsoft.com/office/drawing/2010/main" val="0"/>
+              </a:ext>
+            </a:extLst>
+          </a:blip>
+          <a:stretch>
+            <a:fillRect/>
+          </a:stretch>
+        </p:blipFill>
+        <p:spPr>
+          <a:xfrm>
+            <a:off x="497305" y="779797"/>
+            <a:ext cx="8646695" cy="5975484"/>
+          </a:xfrm>
+          <a:prstGeom prst="rect">
+            <a:avLst/>
+          </a:prstGeom>
+        </p:spPr>
+      </p:pic>
+    </p:spTree>
+    <p:extLst>
+      <p:ext uri="{BB962C8B-B14F-4D97-AF65-F5344CB8AC3E}">
+        <p14:creationId xmlns:p14="http://schemas.microsoft.com/office/powerpoint/2010/main" val="4166845283"/>
+      </p:ext>
+    </p:extLst>
+  </p:cSld>
+  <p:clrMapOvr>
+    <a:masterClrMapping/>
+  </p:clrMapOvr>
+</p:sld>
+</file>
+
+<file path=ppt/slides/slide11.xml><?xml version="1.0" encoding="utf-8"?>
+<p:sld xmlns:a="http://schemas.openxmlformats.org/drawingml/2006/main" xmlns:r="http://schemas.openxmlformats.org/officeDocument/2006/relationships" xmlns:p="http://schemas.openxmlformats.org/presentationml/2006/main">
+  <p:cSld>
+    <p:spTree>
+      <p:nvGrpSpPr>
+        <p:cNvPr id="1" name=""/>
+        <p:cNvGrpSpPr/>
+        <p:nvPr/>
+      </p:nvGrpSpPr>
+      <p:grpSpPr>
+        <a:xfrm>
+          <a:off x="0" y="0"/>
+          <a:ext cx="0" cy="0"/>
+          <a:chOff x="0" y="0"/>
+          <a:chExt cx="0" cy="0"/>
+        </a:xfrm>
+      </p:grpSpPr>
+      <p:sp>
+        <p:nvSpPr>
+          <p:cNvPr id="2" name="Datumsplatzhalter 1">
+            <a:extLst>
+              <a:ext uri="{FF2B5EF4-FFF2-40B4-BE49-F238E27FC236}">
+                <a16:creationId xmlns:a16="http://schemas.microsoft.com/office/drawing/2014/main" id="{26FF4413-2C50-4255-A5D7-47E7DAE7F47F}"/>
+              </a:ext>
+            </a:extLst>
+          </p:cNvPr>
+          <p:cNvSpPr>
+            <a:spLocks noGrp="1"/>
+          </p:cNvSpPr>
+          <p:nvPr>
+            <p:ph type="dt" sz="half" idx="10"/>
+          </p:nvPr>
+        </p:nvSpPr>
+        <p:spPr/>
+        <p:txBody>
+          <a:bodyPr/>
+          <a:lstStyle/>
+          <a:p>
+            <a:fld id="{7A054B8C-EECC-4C6F-BCD4-949C60E889BC}" type="datetime1">
+              <a:rPr lang="de-AT" smtClean="0"/>
+              <a:t>19.11.2017</a:t>
+            </a:fld>
+            <a:endParaRPr lang="en-GB"/>
+          </a:p>
+        </p:txBody>
+      </p:sp>
+      <p:sp>
+        <p:nvSpPr>
+          <p:cNvPr id="3" name="Fußzeilenplatzhalter 2">
+            <a:extLst>
+              <a:ext uri="{FF2B5EF4-FFF2-40B4-BE49-F238E27FC236}">
+                <a16:creationId xmlns:a16="http://schemas.microsoft.com/office/drawing/2014/main" id="{FDA3809B-9939-467B-B7A9-B49C2A99DB5C}"/>
+              </a:ext>
+            </a:extLst>
+          </p:cNvPr>
+          <p:cNvSpPr>
+            <a:spLocks noGrp="1"/>
+          </p:cNvSpPr>
+          <p:nvPr>
+            <p:ph type="ftr" sz="quarter" idx="11"/>
+          </p:nvPr>
+        </p:nvSpPr>
+        <p:spPr/>
+        <p:txBody>
+          <a:bodyPr/>
+          <a:lstStyle/>
+          <a:p>
+            <a:r>
+              <a:rPr lang="en-GB"/>
+              <a:t>SEW</a:t>
+            </a:r>
+          </a:p>
+        </p:txBody>
+      </p:sp>
+      <p:sp>
+        <p:nvSpPr>
+          <p:cNvPr id="4" name="Foliennummernplatzhalter 3">
+            <a:extLst>
+              <a:ext uri="{FF2B5EF4-FFF2-40B4-BE49-F238E27FC236}">
+                <a16:creationId xmlns:a16="http://schemas.microsoft.com/office/drawing/2014/main" id="{88268E5C-8EE5-4F02-AFC1-EB7545300D3C}"/>
+              </a:ext>
+            </a:extLst>
+          </p:cNvPr>
+          <p:cNvSpPr>
+            <a:spLocks noGrp="1"/>
+          </p:cNvSpPr>
+          <p:nvPr>
+            <p:ph type="sldNum" sz="quarter" idx="12"/>
+          </p:nvPr>
+        </p:nvSpPr>
+        <p:spPr/>
+        <p:txBody>
+          <a:bodyPr/>
+          <a:lstStyle/>
+          <a:p>
+            <a:fld id="{305D84B3-2E1E-4142-BA10-D488A77DA32F}" type="slidenum">
+              <a:rPr lang="en-GB" smtClean="0"/>
+              <a:t>11</a:t>
+            </a:fld>
+            <a:endParaRPr lang="en-GB"/>
+          </a:p>
+        </p:txBody>
+      </p:sp>
+      <p:pic>
+        <p:nvPicPr>
+          <p:cNvPr id="6" name="Grafik 5">
+            <a:extLst>
+              <a:ext uri="{FF2B5EF4-FFF2-40B4-BE49-F238E27FC236}">
+                <a16:creationId xmlns:a16="http://schemas.microsoft.com/office/drawing/2014/main" id="{01A8E062-3AE3-4B4F-B9D8-4F8249EA94D2}"/>
+              </a:ext>
+            </a:extLst>
+          </p:cNvPr>
+          <p:cNvPicPr>
+            <a:picLocks noChangeAspect="1"/>
+          </p:cNvPicPr>
+          <p:nvPr/>
+        </p:nvPicPr>
+        <p:blipFill>
+          <a:blip r:embed="rId2">
+            <a:extLst>
+              <a:ext uri="{28A0092B-C50C-407E-A947-70E740481C1C}">
+                <a14:useLocalDpi xmlns:a14="http://schemas.microsoft.com/office/drawing/2010/main" val="0"/>
+              </a:ext>
+            </a:extLst>
+          </a:blip>
+          <a:stretch>
+            <a:fillRect/>
+          </a:stretch>
+        </p:blipFill>
+        <p:spPr>
+          <a:xfrm>
+            <a:off x="453231" y="1031596"/>
+            <a:ext cx="5846572" cy="1223332"/>
+          </a:xfrm>
+          <a:prstGeom prst="rect">
+            <a:avLst/>
+          </a:prstGeom>
+        </p:spPr>
+      </p:pic>
+      <p:pic>
+        <p:nvPicPr>
+          <p:cNvPr id="8" name="Grafik 7">
+            <a:extLst>
+              <a:ext uri="{FF2B5EF4-FFF2-40B4-BE49-F238E27FC236}">
+                <a16:creationId xmlns:a16="http://schemas.microsoft.com/office/drawing/2014/main" id="{490AC1E0-9B25-4484-9D44-9527196B55FC}"/>
+              </a:ext>
+            </a:extLst>
+          </p:cNvPr>
+          <p:cNvPicPr>
+            <a:picLocks noChangeAspect="1"/>
+          </p:cNvPicPr>
+          <p:nvPr/>
+        </p:nvPicPr>
+        <p:blipFill>
+          <a:blip r:embed="rId3">
+            <a:extLst>
+              <a:ext uri="{28A0092B-C50C-407E-A947-70E740481C1C}">
+                <a14:useLocalDpi xmlns:a14="http://schemas.microsoft.com/office/drawing/2010/main" val="0"/>
+              </a:ext>
+            </a:extLst>
+          </a:blip>
+          <a:stretch>
+            <a:fillRect/>
+          </a:stretch>
+        </p:blipFill>
+        <p:spPr>
+          <a:xfrm>
+            <a:off x="453231" y="2918224"/>
+            <a:ext cx="5743715" cy="1662654"/>
+          </a:xfrm>
+          <a:prstGeom prst="rect">
+            <a:avLst/>
+          </a:prstGeom>
+        </p:spPr>
+      </p:pic>
+    </p:spTree>
+    <p:extLst>
+      <p:ext uri="{BB962C8B-B14F-4D97-AF65-F5344CB8AC3E}">
+        <p14:creationId xmlns:p14="http://schemas.microsoft.com/office/powerpoint/2010/main" val="1951865263"/>
+      </p:ext>
+    </p:extLst>
+  </p:cSld>
+  <p:clrMapOvr>
+    <a:masterClrMapping/>
+  </p:clrMapOvr>
+</p:sld>
+</file>
+
+<file path=ppt/slides/slide12.xml><?xml version="1.0" encoding="utf-8"?>
+<p:sld xmlns:a="http://schemas.openxmlformats.org/drawingml/2006/main" xmlns:r="http://schemas.openxmlformats.org/officeDocument/2006/relationships" xmlns:p="http://schemas.openxmlformats.org/presentationml/2006/main">
+  <p:cSld>
+    <p:spTree>
+      <p:nvGrpSpPr>
+        <p:cNvPr id="1" name=""/>
+        <p:cNvGrpSpPr/>
+        <p:nvPr/>
+      </p:nvGrpSpPr>
+      <p:grpSpPr>
+        <a:xfrm>
+          <a:off x="0" y="0"/>
+          <a:ext cx="0" cy="0"/>
+          <a:chOff x="0" y="0"/>
+          <a:chExt cx="0" cy="0"/>
+        </a:xfrm>
+      </p:grpSpPr>
+      <p:sp>
+        <p:nvSpPr>
+          <p:cNvPr id="2" name="Datumsplatzhalter 1">
+            <a:extLst>
+              <a:ext uri="{FF2B5EF4-FFF2-40B4-BE49-F238E27FC236}">
+                <a16:creationId xmlns:a16="http://schemas.microsoft.com/office/drawing/2014/main" id="{79B2999A-1A2E-4FD2-9470-741C9B7C0FF3}"/>
+              </a:ext>
+            </a:extLst>
+          </p:cNvPr>
+          <p:cNvSpPr>
+            <a:spLocks noGrp="1"/>
+          </p:cNvSpPr>
+          <p:nvPr>
+            <p:ph type="dt" sz="half" idx="10"/>
+          </p:nvPr>
+        </p:nvSpPr>
+        <p:spPr/>
+        <p:txBody>
+          <a:bodyPr/>
+          <a:lstStyle/>
+          <a:p>
+            <a:fld id="{7A054B8C-EECC-4C6F-BCD4-949C60E889BC}" type="datetime1">
+              <a:rPr lang="de-AT" smtClean="0"/>
+              <a:t>19.11.2017</a:t>
+            </a:fld>
+            <a:endParaRPr lang="en-GB"/>
+          </a:p>
+        </p:txBody>
+      </p:sp>
+      <p:sp>
+        <p:nvSpPr>
+          <p:cNvPr id="3" name="Fußzeilenplatzhalter 2">
+            <a:extLst>
+              <a:ext uri="{FF2B5EF4-FFF2-40B4-BE49-F238E27FC236}">
+                <a16:creationId xmlns:a16="http://schemas.microsoft.com/office/drawing/2014/main" id="{78E552F8-6608-4A92-852B-B860859284D7}"/>
+              </a:ext>
+            </a:extLst>
+          </p:cNvPr>
+          <p:cNvSpPr>
+            <a:spLocks noGrp="1"/>
+          </p:cNvSpPr>
+          <p:nvPr>
+            <p:ph type="ftr" sz="quarter" idx="11"/>
+          </p:nvPr>
+        </p:nvSpPr>
+        <p:spPr/>
+        <p:txBody>
+          <a:bodyPr/>
+          <a:lstStyle/>
+          <a:p>
+            <a:r>
+              <a:rPr lang="en-GB"/>
+              <a:t>SEW</a:t>
+            </a:r>
+          </a:p>
+        </p:txBody>
+      </p:sp>
+      <p:sp>
+        <p:nvSpPr>
+          <p:cNvPr id="4" name="Foliennummernplatzhalter 3">
+            <a:extLst>
+              <a:ext uri="{FF2B5EF4-FFF2-40B4-BE49-F238E27FC236}">
+                <a16:creationId xmlns:a16="http://schemas.microsoft.com/office/drawing/2014/main" id="{E967A4EC-AE48-47BB-AF34-BC35F759C225}"/>
+              </a:ext>
+            </a:extLst>
+          </p:cNvPr>
+          <p:cNvSpPr>
+            <a:spLocks noGrp="1"/>
+          </p:cNvSpPr>
+          <p:nvPr>
+            <p:ph type="sldNum" sz="quarter" idx="12"/>
+          </p:nvPr>
+        </p:nvSpPr>
+        <p:spPr/>
+        <p:txBody>
+          <a:bodyPr/>
+          <a:lstStyle/>
+          <a:p>
+            <a:fld id="{305D84B3-2E1E-4142-BA10-D488A77DA32F}" type="slidenum">
+              <a:rPr lang="en-GB" smtClean="0"/>
+              <a:t>12</a:t>
+            </a:fld>
+            <a:endParaRPr lang="en-GB"/>
+          </a:p>
+        </p:txBody>
+      </p:sp>
+      <p:pic>
+        <p:nvPicPr>
+          <p:cNvPr id="6" name="Grafik 5">
+            <a:extLst>
+              <a:ext uri="{FF2B5EF4-FFF2-40B4-BE49-F238E27FC236}">
+                <a16:creationId xmlns:a16="http://schemas.microsoft.com/office/drawing/2014/main" id="{9D0E2FCE-65BD-47BE-BDFC-0FEA3AE86231}"/>
+              </a:ext>
+            </a:extLst>
+          </p:cNvPr>
+          <p:cNvPicPr>
+            <a:picLocks noChangeAspect="1"/>
+          </p:cNvPicPr>
+          <p:nvPr/>
+        </p:nvPicPr>
+        <p:blipFill>
+          <a:blip r:embed="rId2">
+            <a:extLst>
+              <a:ext uri="{28A0092B-C50C-407E-A947-70E740481C1C}">
+                <a14:useLocalDpi xmlns:a14="http://schemas.microsoft.com/office/drawing/2010/main" val="0"/>
+              </a:ext>
+            </a:extLst>
+          </a:blip>
+          <a:stretch>
+            <a:fillRect/>
+          </a:stretch>
+        </p:blipFill>
+        <p:spPr>
+          <a:xfrm>
+            <a:off x="651604" y="1063924"/>
+            <a:ext cx="6256392" cy="5230344"/>
+          </a:xfrm>
+          <a:prstGeom prst="rect">
+            <a:avLst/>
+          </a:prstGeom>
+        </p:spPr>
+      </p:pic>
+    </p:spTree>
+    <p:extLst>
+      <p:ext uri="{BB962C8B-B14F-4D97-AF65-F5344CB8AC3E}">
+        <p14:creationId xmlns:p14="http://schemas.microsoft.com/office/powerpoint/2010/main" val="4009876560"/>
+      </p:ext>
+    </p:extLst>
+  </p:cSld>
+  <p:clrMapOvr>
+    <a:masterClrMapping/>
+  </p:clrMapOvr>
+</p:sld>
+</file>
+
+<file path=ppt/slides/slide13.xml><?xml version="1.0" encoding="utf-8"?>
+<p:sld xmlns:a="http://schemas.openxmlformats.org/drawingml/2006/main" xmlns:r="http://schemas.openxmlformats.org/officeDocument/2006/relationships" xmlns:p="http://schemas.openxmlformats.org/presentationml/2006/main">
+  <p:cSld>
+    <p:spTree>
+      <p:nvGrpSpPr>
+        <p:cNvPr id="1" name=""/>
+        <p:cNvGrpSpPr/>
+        <p:nvPr/>
+      </p:nvGrpSpPr>
+      <p:grpSpPr>
+        <a:xfrm>
+          <a:off x="0" y="0"/>
+          <a:ext cx="0" cy="0"/>
+          <a:chOff x="0" y="0"/>
+          <a:chExt cx="0" cy="0"/>
+        </a:xfrm>
+      </p:grpSpPr>
+      <p:sp>
+        <p:nvSpPr>
+          <p:cNvPr id="2" name="Datumsplatzhalter 1">
+            <a:extLst>
+              <a:ext uri="{FF2B5EF4-FFF2-40B4-BE49-F238E27FC236}">
                 <a16:creationId xmlns:a16="http://schemas.microsoft.com/office/drawing/2014/main" id="{C4B5C403-B28D-4E7F-8678-F7BCF55247E5}"/>
               </a:ext>
             </a:extLst>
@@ -8665,7 +9164,7 @@
           <a:p>
             <a:fld id="{7A054B8C-EECC-4C6F-BCD4-949C60E889BC}" type="datetime1">
               <a:rPr lang="de-AT" smtClean="0"/>
-              <a:t>15.11.2017</a:t>
+              <a:t>19.11.2017</a:t>
             </a:fld>
             <a:endParaRPr lang="en-GB"/>
           </a:p>
@@ -8722,7 +9221,7 @@
           <a:p>
             <a:fld id="{305D84B3-2E1E-4142-BA10-D488A77DA32F}" type="slidenum">
               <a:rPr lang="en-GB" smtClean="0"/>
-              <a:t>10</a:t>
+              <a:t>13</a:t>
             </a:fld>
             <a:endParaRPr lang="en-GB"/>
           </a:p>
@@ -8777,7 +9276,7 @@
 </p:sld>
 </file>
 
-<file path=ppt/slides/slide11.xml><?xml version="1.0" encoding="utf-8"?>
+<file path=ppt/slides/slide14.xml><?xml version="1.0" encoding="utf-8"?>
 <p:sld xmlns:a="http://schemas.openxmlformats.org/drawingml/2006/main" xmlns:r="http://schemas.openxmlformats.org/officeDocument/2006/relationships" xmlns:p="http://schemas.openxmlformats.org/presentationml/2006/main">
   <p:cSld>
     <p:spTree>
@@ -8817,7 +9316,7 @@
           <a:p>
             <a:fld id="{7A054B8C-EECC-4C6F-BCD4-949C60E889BC}" type="datetime1">
               <a:rPr lang="de-AT" smtClean="0"/>
-              <a:t>15.11.2017</a:t>
+              <a:t>19.11.2017</a:t>
             </a:fld>
             <a:endParaRPr lang="en-GB"/>
           </a:p>
@@ -8874,7 +9373,7 @@
           <a:p>
             <a:fld id="{305D84B3-2E1E-4142-BA10-D488A77DA32F}" type="slidenum">
               <a:rPr lang="en-GB" smtClean="0"/>
-              <a:t>11</a:t>
+              <a:t>14</a:t>
             </a:fld>
             <a:endParaRPr lang="en-GB"/>
           </a:p>
@@ -8929,7 +9428,7 @@
 </p:sld>
 </file>
 
-<file path=ppt/slides/slide12.xml><?xml version="1.0" encoding="utf-8"?>
+<file path=ppt/slides/slide15.xml><?xml version="1.0" encoding="utf-8"?>
 <p:sld xmlns:a="http://schemas.openxmlformats.org/drawingml/2006/main" xmlns:r="http://schemas.openxmlformats.org/officeDocument/2006/relationships" xmlns:p="http://schemas.openxmlformats.org/presentationml/2006/main">
   <p:cSld>
     <p:spTree>
@@ -8997,7 +9496,7 @@
           <a:p>
             <a:fld id="{82DF4458-0B94-415C-B513-EF078308B517}" type="datetime1">
               <a:rPr lang="de-AT" smtClean="0"/>
-              <a:t>15.11.2017</a:t>
+              <a:t>19.11.2017</a:t>
             </a:fld>
             <a:endParaRPr lang="en-GB"/>
           </a:p>
@@ -9054,7 +9553,7 @@
           <a:p>
             <a:fld id="{305D84B3-2E1E-4142-BA10-D488A77DA32F}" type="slidenum">
               <a:rPr lang="en-GB" smtClean="0"/>
-              <a:t>12</a:t>
+              <a:t>15</a:t>
             </a:fld>
             <a:endParaRPr lang="en-GB"/>
           </a:p>
@@ -9150,7 +9649,7 @@
 </p:sld>
 </file>
 
-<file path=ppt/slides/slide13.xml><?xml version="1.0" encoding="utf-8"?>
+<file path=ppt/slides/slide16.xml><?xml version="1.0" encoding="utf-8"?>
 <p:sld xmlns:a="http://schemas.openxmlformats.org/drawingml/2006/main" xmlns:r="http://schemas.openxmlformats.org/officeDocument/2006/relationships" xmlns:p="http://schemas.openxmlformats.org/presentationml/2006/main">
   <p:cSld>
     <p:spTree>
@@ -9244,7 +9743,7 @@
           <a:p>
             <a:fld id="{71E33593-A42C-4932-9C8F-FFDF3EC0AE31}" type="datetime1">
               <a:rPr lang="de-AT" smtClean="0"/>
-              <a:t>15.11.2017</a:t>
+              <a:t>19.11.2017</a:t>
             </a:fld>
             <a:endParaRPr lang="en-GB"/>
           </a:p>
@@ -9301,7 +9800,7 @@
           <a:p>
             <a:fld id="{305D84B3-2E1E-4142-BA10-D488A77DA32F}" type="slidenum">
               <a:rPr lang="en-GB" smtClean="0"/>
-              <a:t>13</a:t>
+              <a:t>16</a:t>
             </a:fld>
             <a:endParaRPr lang="en-GB"/>
           </a:p>
@@ -9320,7 +9819,7 @@
 </p:sld>
 </file>
 
-<file path=ppt/slides/slide14.xml><?xml version="1.0" encoding="utf-8"?>
+<file path=ppt/slides/slide17.xml><?xml version="1.0" encoding="utf-8"?>
 <p:sld xmlns:a="http://schemas.openxmlformats.org/drawingml/2006/main" xmlns:r="http://schemas.openxmlformats.org/officeDocument/2006/relationships" xmlns:p="http://schemas.openxmlformats.org/presentationml/2006/main">
   <p:cSld>
     <p:spTree>
@@ -9604,7 +10103,7 @@
           <a:p>
             <a:fld id="{C6AAF3EF-A190-4F36-B438-0D2057303B3A}" type="datetime1">
               <a:rPr lang="de-AT" smtClean="0"/>
-              <a:t>15.11.2017</a:t>
+              <a:t>19.11.2017</a:t>
             </a:fld>
             <a:endParaRPr lang="en-GB"/>
           </a:p>
@@ -9661,7 +10160,7 @@
           <a:p>
             <a:fld id="{305D84B3-2E1E-4142-BA10-D488A77DA32F}" type="slidenum">
               <a:rPr lang="en-GB" smtClean="0"/>
-              <a:t>14</a:t>
+              <a:t>17</a:t>
             </a:fld>
             <a:endParaRPr lang="en-GB" dirty="0"/>
           </a:p>
@@ -9680,7 +10179,7 @@
 </p:sld>
 </file>
 
-<file path=ppt/slides/slide15.xml><?xml version="1.0" encoding="utf-8"?>
+<file path=ppt/slides/slide18.xml><?xml version="1.0" encoding="utf-8"?>
 <p:sld xmlns:a="http://schemas.openxmlformats.org/drawingml/2006/main" xmlns:r="http://schemas.openxmlformats.org/officeDocument/2006/relationships" xmlns:p="http://schemas.openxmlformats.org/presentationml/2006/main">
   <p:cSld>
     <p:spTree>
@@ -9808,7 +10307,7 @@
           <a:p>
             <a:fld id="{71E33593-A42C-4932-9C8F-FFDF3EC0AE31}" type="datetime1">
               <a:rPr lang="de-AT" smtClean="0"/>
-              <a:t>15.11.2017</a:t>
+              <a:t>19.11.2017</a:t>
             </a:fld>
             <a:endParaRPr lang="en-GB"/>
           </a:p>
@@ -9865,7 +10364,7 @@
           <a:p>
             <a:fld id="{305D84B3-2E1E-4142-BA10-D488A77DA32F}" type="slidenum">
               <a:rPr lang="en-GB" smtClean="0"/>
-              <a:t>15</a:t>
+              <a:t>18</a:t>
             </a:fld>
             <a:endParaRPr lang="en-GB"/>
           </a:p>
@@ -10012,7 +10511,7 @@
           <a:p>
             <a:fld id="{BC97D3DA-AFB9-4BCA-99C1-499336D1BE41}" type="datetime1">
               <a:rPr lang="de-AT" smtClean="0"/>
-              <a:t>15.11.2017</a:t>
+              <a:t>19.11.2017</a:t>
             </a:fld>
             <a:endParaRPr lang="en-GB"/>
           </a:p>
@@ -10301,7 +10800,7 @@
           <a:p>
             <a:fld id="{C6AAF3EF-A190-4F36-B438-0D2057303B3A}" type="datetime1">
               <a:rPr lang="de-AT" smtClean="0"/>
-              <a:t>15.11.2017</a:t>
+              <a:t>19.11.2017</a:t>
             </a:fld>
             <a:endParaRPr lang="en-GB"/>
           </a:p>
@@ -10603,7 +11102,7 @@
           <a:p>
             <a:fld id="{C6AAF3EF-A190-4F36-B438-0D2057303B3A}" type="datetime1">
               <a:rPr lang="de-AT" smtClean="0"/>
-              <a:t>15.11.2017</a:t>
+              <a:t>19.11.2017</a:t>
             </a:fld>
             <a:endParaRPr lang="en-GB" dirty="0"/>
           </a:p>
@@ -10753,12 +11252,28 @@
           <a:lstStyle/>
           <a:p>
             <a:r>
-              <a:rPr lang="de-AT" dirty="0" err="1"/>
-              <a:t>Example</a:t>
+              <a:rPr lang="en-GB" dirty="0" err="1"/>
+              <a:t>Differenation</a:t>
             </a:r>
             <a:r>
               <a:rPr lang="de-AT" dirty="0"/>
               <a:t> </a:t>
+            </a:r>
+            <a:r>
+              <a:rPr lang="de-AT" dirty="0" err="1"/>
+              <a:t>from</a:t>
+            </a:r>
+            <a:r>
+              <a:rPr lang="de-AT" dirty="0"/>
+              <a:t> </a:t>
+            </a:r>
+            <a:r>
+              <a:rPr lang="de-AT" dirty="0" err="1"/>
+              <a:t>other</a:t>
+            </a:r>
+            <a:r>
+              <a:rPr lang="de-AT" dirty="0"/>
+              <a:t> Patterns </a:t>
             </a:r>
             <a:endParaRPr lang="en-GB" dirty="0"/>
           </a:p>
@@ -10812,7 +11327,7 @@
           <a:p>
             <a:fld id="{CA35A274-A62A-42B4-BD58-C44215261C59}" type="datetime1">
               <a:rPr lang="de-AT" smtClean="0"/>
-              <a:t>15.11.2017</a:t>
+              <a:t>19.11.2017</a:t>
             </a:fld>
             <a:endParaRPr lang="en-GB" dirty="0"/>
           </a:p>
@@ -10878,7 +11393,7 @@
     </p:spTree>
     <p:extLst>
       <p:ext uri="{BB962C8B-B14F-4D97-AF65-F5344CB8AC3E}">
-        <p14:creationId xmlns:p14="http://schemas.microsoft.com/office/powerpoint/2010/main" val="2300021862"/>
+        <p14:creationId xmlns:p14="http://schemas.microsoft.com/office/powerpoint/2010/main" val="778620347"/>
       </p:ext>
     </p:extLst>
   </p:cSld>
@@ -10907,10 +11422,10 @@
       </p:grpSpPr>
       <p:sp>
         <p:nvSpPr>
-          <p:cNvPr id="7" name="Titel 6">
+          <p:cNvPr id="2" name="Titel 1">
             <a:extLst>
               <a:ext uri="{FF2B5EF4-FFF2-40B4-BE49-F238E27FC236}">
-                <a16:creationId xmlns:a16="http://schemas.microsoft.com/office/drawing/2014/main" id="{C65ADE24-03A3-4738-87F5-D487E0CFD7A7}"/>
+                <a16:creationId xmlns:a16="http://schemas.microsoft.com/office/drawing/2014/main" id="{80A381EE-665A-48FA-866D-6CD0F47CBB1A}"/>
               </a:ext>
             </a:extLst>
           </p:cNvPr>
@@ -10926,16 +11441,19 @@
           <a:bodyPr/>
           <a:lstStyle/>
           <a:p>
-            <a:endParaRPr lang="en-GB" dirty="0"/>
-          </a:p>
-        </p:txBody>
-      </p:sp>
-      <p:sp>
-        <p:nvSpPr>
-          <p:cNvPr id="8" name="Inhaltsplatzhalter 7">
+            <a:r>
+              <a:rPr lang="de-AT" dirty="0"/>
+              <a:t>Bridge Pattern</a:t>
+            </a:r>
+          </a:p>
+        </p:txBody>
+      </p:sp>
+      <p:sp>
+        <p:nvSpPr>
+          <p:cNvPr id="3" name="Inhaltsplatzhalter 2">
             <a:extLst>
               <a:ext uri="{FF2B5EF4-FFF2-40B4-BE49-F238E27FC236}">
-                <a16:creationId xmlns:a16="http://schemas.microsoft.com/office/drawing/2014/main" id="{C11950B7-B6A0-4133-AE1E-7EF5EA458188}"/>
+                <a16:creationId xmlns:a16="http://schemas.microsoft.com/office/drawing/2014/main" id="{2CD62C93-CE27-498A-97EC-A1624CE8050B}"/>
               </a:ext>
             </a:extLst>
           </p:cNvPr>
@@ -10952,17 +11470,10 @@
           <a:lstStyle/>
           <a:p>
             <a:r>
-              <a:rPr lang="en-GB" dirty="0"/>
-              <a:t>an Audio Player which can play mp3 files only wants to use an advanced audio player which can play </a:t>
-            </a:r>
-            <a:r>
-              <a:rPr lang="en-GB" dirty="0" err="1"/>
-              <a:t>vlc</a:t>
-            </a:r>
-            <a:r>
-              <a:rPr lang="en-GB" dirty="0"/>
-              <a:t> and mp4 files</a:t>
-            </a:r>
+              <a:rPr lang="en-US" dirty="0"/>
+              <a:t>Adapter makes things work after they're designed; Bridge makes them work before they are</a:t>
+            </a:r>
+            <a:endParaRPr lang="de-AT" dirty="0"/>
           </a:p>
         </p:txBody>
       </p:sp>
@@ -10971,7 +11482,7 @@
           <p:cNvPr id="4" name="Datumsplatzhalter 3">
             <a:extLst>
               <a:ext uri="{FF2B5EF4-FFF2-40B4-BE49-F238E27FC236}">
-                <a16:creationId xmlns:a16="http://schemas.microsoft.com/office/drawing/2014/main" id="{C4D2CD01-D47B-47DA-BD54-0F4BF487AE4F}"/>
+                <a16:creationId xmlns:a16="http://schemas.microsoft.com/office/drawing/2014/main" id="{C18FCA7C-1F2B-4A68-A1DA-0BFFC2262E0B}"/>
               </a:ext>
             </a:extLst>
           </p:cNvPr>
@@ -10987,9 +11498,9 @@
           <a:bodyPr/>
           <a:lstStyle/>
           <a:p>
-            <a:fld id="{71E33593-A42C-4932-9C8F-FFDF3EC0AE31}" type="datetime1">
+            <a:fld id="{C6AAF3EF-A190-4F36-B438-0D2057303B3A}" type="datetime1">
               <a:rPr lang="de-AT" smtClean="0"/>
-              <a:t>15.11.2017</a:t>
+              <a:t>19.11.2017</a:t>
             </a:fld>
             <a:endParaRPr lang="en-GB"/>
           </a:p>
@@ -11000,7 +11511,7 @@
           <p:cNvPr id="5" name="Fußzeilenplatzhalter 4">
             <a:extLst>
               <a:ext uri="{FF2B5EF4-FFF2-40B4-BE49-F238E27FC236}">
-                <a16:creationId xmlns:a16="http://schemas.microsoft.com/office/drawing/2014/main" id="{14A79B3D-7CB5-496C-9200-94BB5FD38FF2}"/>
+                <a16:creationId xmlns:a16="http://schemas.microsoft.com/office/drawing/2014/main" id="{D568E8CA-3EF9-4C5D-85E3-414F9D0381C2}"/>
               </a:ext>
             </a:extLst>
           </p:cNvPr>
@@ -11028,7 +11539,7 @@
           <p:cNvPr id="6" name="Foliennummernplatzhalter 5">
             <a:extLst>
               <a:ext uri="{FF2B5EF4-FFF2-40B4-BE49-F238E27FC236}">
-                <a16:creationId xmlns:a16="http://schemas.microsoft.com/office/drawing/2014/main" id="{5C35E209-E9C9-4835-8945-0C965A2DCA8B}"/>
+                <a16:creationId xmlns:a16="http://schemas.microsoft.com/office/drawing/2014/main" id="{99BE7AC5-87C3-4834-B09D-335E0C066B14}"/>
               </a:ext>
             </a:extLst>
           </p:cNvPr>
@@ -11048,14 +11559,14 @@
               <a:rPr lang="en-GB" smtClean="0"/>
               <a:t>6</a:t>
             </a:fld>
-            <a:endParaRPr lang="en-GB"/>
+            <a:endParaRPr lang="en-GB" dirty="0"/>
           </a:p>
         </p:txBody>
       </p:sp>
     </p:spTree>
     <p:extLst>
       <p:ext uri="{BB962C8B-B14F-4D97-AF65-F5344CB8AC3E}">
-        <p14:creationId xmlns:p14="http://schemas.microsoft.com/office/powerpoint/2010/main" val="3650476640"/>
+        <p14:creationId xmlns:p14="http://schemas.microsoft.com/office/powerpoint/2010/main" val="1334741129"/>
       </p:ext>
     </p:extLst>
   </p:cSld>
@@ -11084,10 +11595,10 @@
       </p:grpSpPr>
       <p:sp>
         <p:nvSpPr>
-          <p:cNvPr id="2" name="Datumsplatzhalter 1">
+          <p:cNvPr id="2" name="Titel 1">
             <a:extLst>
               <a:ext uri="{FF2B5EF4-FFF2-40B4-BE49-F238E27FC236}">
-                <a16:creationId xmlns:a16="http://schemas.microsoft.com/office/drawing/2014/main" id="{F34B80F7-DA4F-410B-8853-9359F0913269}"/>
+                <a16:creationId xmlns:a16="http://schemas.microsoft.com/office/drawing/2014/main" id="{80A381EE-665A-48FA-866D-6CD0F47CBB1A}"/>
               </a:ext>
             </a:extLst>
           </p:cNvPr>
@@ -11095,7 +11606,7 @@
             <a:spLocks noGrp="1"/>
           </p:cNvSpPr>
           <p:nvPr>
-            <p:ph type="dt" sz="half" idx="10"/>
+            <p:ph type="title"/>
           </p:nvPr>
         </p:nvSpPr>
         <p:spPr/>
@@ -11103,20 +11614,23 @@
           <a:bodyPr/>
           <a:lstStyle/>
           <a:p>
-            <a:fld id="{7A054B8C-EECC-4C6F-BCD4-949C60E889BC}" type="datetime1">
-              <a:rPr lang="de-AT" smtClean="0"/>
-              <a:t>15.11.2017</a:t>
-            </a:fld>
-            <a:endParaRPr lang="en-GB"/>
-          </a:p>
-        </p:txBody>
-      </p:sp>
-      <p:sp>
-        <p:nvSpPr>
-          <p:cNvPr id="3" name="Fußzeilenplatzhalter 2">
+            <a:r>
+              <a:rPr lang="de-AT" dirty="0" err="1"/>
+              <a:t>Facade</a:t>
+            </a:r>
+            <a:r>
+              <a:rPr lang="de-AT" dirty="0"/>
+              <a:t> Pattern</a:t>
+            </a:r>
+          </a:p>
+        </p:txBody>
+      </p:sp>
+      <p:sp>
+        <p:nvSpPr>
+          <p:cNvPr id="3" name="Inhaltsplatzhalter 2">
             <a:extLst>
               <a:ext uri="{FF2B5EF4-FFF2-40B4-BE49-F238E27FC236}">
-                <a16:creationId xmlns:a16="http://schemas.microsoft.com/office/drawing/2014/main" id="{8706E88D-BC8D-4082-80C7-EF2F63D3D416}"/>
+                <a16:creationId xmlns:a16="http://schemas.microsoft.com/office/drawing/2014/main" id="{2CD62C93-CE27-498A-97EC-A1624CE8050B}"/>
               </a:ext>
             </a:extLst>
           </p:cNvPr>
@@ -11124,7 +11638,7 @@
             <a:spLocks noGrp="1"/>
           </p:cNvSpPr>
           <p:nvPr>
-            <p:ph type="ftr" sz="quarter" idx="11"/>
+            <p:ph idx="1"/>
           </p:nvPr>
         </p:nvSpPr>
         <p:spPr/>
@@ -11133,6 +11647,220 @@
           <a:lstStyle/>
           <a:p>
             <a:r>
+              <a:rPr lang="de-AT" dirty="0"/>
+              <a:t>The </a:t>
+            </a:r>
+            <a:r>
+              <a:rPr lang="de-AT" dirty="0" err="1"/>
+              <a:t>Facade</a:t>
+            </a:r>
+            <a:r>
+              <a:rPr lang="de-AT" dirty="0"/>
+              <a:t> Pattern </a:t>
+            </a:r>
+            <a:r>
+              <a:rPr lang="de-AT" dirty="0" err="1"/>
+              <a:t>is</a:t>
+            </a:r>
+            <a:r>
+              <a:rPr lang="de-AT" dirty="0"/>
+              <a:t> just </a:t>
+            </a:r>
+            <a:r>
+              <a:rPr lang="de-AT" dirty="0" err="1"/>
+              <a:t>to</a:t>
+            </a:r>
+            <a:r>
+              <a:rPr lang="de-AT" dirty="0"/>
+              <a:t> </a:t>
+            </a:r>
+            <a:r>
+              <a:rPr lang="de-AT" dirty="0" err="1"/>
+              <a:t>simplify</a:t>
+            </a:r>
+            <a:r>
+              <a:rPr lang="de-AT" dirty="0"/>
+              <a:t> a </a:t>
+            </a:r>
+            <a:r>
+              <a:rPr lang="de-AT" dirty="0" err="1"/>
+              <a:t>user</a:t>
+            </a:r>
+            <a:r>
+              <a:rPr lang="de-AT" dirty="0"/>
+              <a:t> </a:t>
+            </a:r>
+            <a:r>
+              <a:rPr lang="de-AT" dirty="0" err="1"/>
+              <a:t>interaction</a:t>
+            </a:r>
+            <a:r>
+              <a:rPr lang="de-AT" dirty="0"/>
+              <a:t> </a:t>
+            </a:r>
+            <a:r>
+              <a:rPr lang="de-AT" dirty="0" err="1"/>
+              <a:t>with</a:t>
+            </a:r>
+            <a:r>
+              <a:rPr lang="de-AT" dirty="0"/>
+              <a:t> an </a:t>
+            </a:r>
+            <a:r>
+              <a:rPr lang="de-AT" dirty="0" err="1"/>
+              <a:t>interface</a:t>
+            </a:r>
+            <a:r>
+              <a:rPr lang="de-AT" dirty="0"/>
+              <a:t>, </a:t>
+            </a:r>
+            <a:r>
+              <a:rPr lang="de-AT" dirty="0" err="1"/>
+              <a:t>the</a:t>
+            </a:r>
+            <a:r>
+              <a:rPr lang="de-AT" dirty="0"/>
+              <a:t> Adapter Pattern </a:t>
+            </a:r>
+            <a:r>
+              <a:rPr lang="de-AT" dirty="0" err="1"/>
+              <a:t>handles</a:t>
+            </a:r>
+            <a:r>
+              <a:rPr lang="de-AT" dirty="0"/>
+              <a:t> </a:t>
+            </a:r>
+            <a:r>
+              <a:rPr lang="de-AT" dirty="0" err="1"/>
+              <a:t>complex</a:t>
+            </a:r>
+            <a:r>
+              <a:rPr lang="de-AT" dirty="0"/>
+              <a:t> </a:t>
+            </a:r>
+            <a:r>
+              <a:rPr lang="de-AT" dirty="0" err="1"/>
+              <a:t>interactions</a:t>
+            </a:r>
+            <a:r>
+              <a:rPr lang="de-AT" dirty="0"/>
+              <a:t> </a:t>
+            </a:r>
+            <a:r>
+              <a:rPr lang="de-AT" dirty="0" err="1"/>
+              <a:t>by</a:t>
+            </a:r>
+            <a:r>
+              <a:rPr lang="de-AT" dirty="0"/>
+              <a:t> </a:t>
+            </a:r>
+            <a:r>
+              <a:rPr lang="de-AT" dirty="0" err="1"/>
+              <a:t>reconstructing</a:t>
+            </a:r>
+            <a:r>
+              <a:rPr lang="de-AT" dirty="0"/>
+              <a:t> </a:t>
+            </a:r>
+            <a:r>
+              <a:rPr lang="de-AT" dirty="0" err="1"/>
+              <a:t>incoming</a:t>
+            </a:r>
+            <a:r>
+              <a:rPr lang="de-AT" dirty="0"/>
+              <a:t> </a:t>
+            </a:r>
+            <a:r>
+              <a:rPr lang="de-AT" dirty="0" err="1"/>
+              <a:t>data</a:t>
+            </a:r>
+            <a:r>
+              <a:rPr lang="de-AT" dirty="0"/>
+              <a:t> </a:t>
+            </a:r>
+            <a:r>
+              <a:rPr lang="de-AT" dirty="0" err="1"/>
+              <a:t>for</a:t>
+            </a:r>
+            <a:r>
+              <a:rPr lang="de-AT" dirty="0"/>
+              <a:t> </a:t>
+            </a:r>
+            <a:r>
+              <a:rPr lang="de-AT" dirty="0" err="1"/>
+              <a:t>the</a:t>
+            </a:r>
+            <a:r>
+              <a:rPr lang="de-AT" dirty="0"/>
+              <a:t> </a:t>
+            </a:r>
+            <a:r>
+              <a:rPr lang="de-AT" dirty="0" err="1"/>
+              <a:t>underlying</a:t>
+            </a:r>
+            <a:r>
+              <a:rPr lang="de-AT" dirty="0"/>
+              <a:t> </a:t>
+            </a:r>
+            <a:r>
+              <a:rPr lang="de-AT" dirty="0" err="1"/>
+              <a:t>objects</a:t>
+            </a:r>
+            <a:endParaRPr lang="de-AT" dirty="0"/>
+          </a:p>
+        </p:txBody>
+      </p:sp>
+      <p:sp>
+        <p:nvSpPr>
+          <p:cNvPr id="4" name="Datumsplatzhalter 3">
+            <a:extLst>
+              <a:ext uri="{FF2B5EF4-FFF2-40B4-BE49-F238E27FC236}">
+                <a16:creationId xmlns:a16="http://schemas.microsoft.com/office/drawing/2014/main" id="{C18FCA7C-1F2B-4A68-A1DA-0BFFC2262E0B}"/>
+              </a:ext>
+            </a:extLst>
+          </p:cNvPr>
+          <p:cNvSpPr>
+            <a:spLocks noGrp="1"/>
+          </p:cNvSpPr>
+          <p:nvPr>
+            <p:ph type="dt" sz="half" idx="10"/>
+          </p:nvPr>
+        </p:nvSpPr>
+        <p:spPr/>
+        <p:txBody>
+          <a:bodyPr/>
+          <a:lstStyle/>
+          <a:p>
+            <a:fld id="{C6AAF3EF-A190-4F36-B438-0D2057303B3A}" type="datetime1">
+              <a:rPr lang="de-AT" smtClean="0"/>
+              <a:t>19.11.2017</a:t>
+            </a:fld>
+            <a:endParaRPr lang="en-GB"/>
+          </a:p>
+        </p:txBody>
+      </p:sp>
+      <p:sp>
+        <p:nvSpPr>
+          <p:cNvPr id="5" name="Fußzeilenplatzhalter 4">
+            <a:extLst>
+              <a:ext uri="{FF2B5EF4-FFF2-40B4-BE49-F238E27FC236}">
+                <a16:creationId xmlns:a16="http://schemas.microsoft.com/office/drawing/2014/main" id="{D568E8CA-3EF9-4C5D-85E3-414F9D0381C2}"/>
+              </a:ext>
+            </a:extLst>
+          </p:cNvPr>
+          <p:cNvSpPr>
+            <a:spLocks noGrp="1"/>
+          </p:cNvSpPr>
+          <p:nvPr>
+            <p:ph type="ftr" sz="quarter" idx="11"/>
+          </p:nvPr>
+        </p:nvSpPr>
+        <p:spPr/>
+        <p:txBody>
+          <a:bodyPr/>
+          <a:lstStyle/>
+          <a:p>
+            <a:r>
               <a:rPr lang="en-GB"/>
               <a:t>SEW</a:t>
             </a:r>
@@ -11141,10 +11869,10 @@
       </p:sp>
       <p:sp>
         <p:nvSpPr>
-          <p:cNvPr id="4" name="Foliennummernplatzhalter 3">
+          <p:cNvPr id="6" name="Foliennummernplatzhalter 5">
             <a:extLst>
               <a:ext uri="{FF2B5EF4-FFF2-40B4-BE49-F238E27FC236}">
-                <a16:creationId xmlns:a16="http://schemas.microsoft.com/office/drawing/2014/main" id="{C970BFFB-78DC-4983-BEA3-0875CDAB0FAE}"/>
+                <a16:creationId xmlns:a16="http://schemas.microsoft.com/office/drawing/2014/main" id="{99BE7AC5-87C3-4834-B09D-335E0C066B14}"/>
               </a:ext>
             </a:extLst>
           </p:cNvPr>
@@ -11164,50 +11892,14 @@
               <a:rPr lang="en-GB" smtClean="0"/>
               <a:t>7</a:t>
             </a:fld>
-            <a:endParaRPr lang="en-GB"/>
-          </a:p>
-        </p:txBody>
-      </p:sp>
-      <p:pic>
-        <p:nvPicPr>
-          <p:cNvPr id="6" name="Grafik 5">
-            <a:extLst>
-              <a:ext uri="{FF2B5EF4-FFF2-40B4-BE49-F238E27FC236}">
-                <a16:creationId xmlns:a16="http://schemas.microsoft.com/office/drawing/2014/main" id="{4B36DC9D-DB5C-42CD-9B7F-628189256C0F}"/>
-              </a:ext>
-            </a:extLst>
-          </p:cNvPr>
-          <p:cNvPicPr>
-            <a:picLocks noChangeAspect="1"/>
-          </p:cNvPicPr>
-          <p:nvPr/>
-        </p:nvPicPr>
-        <p:blipFill>
-          <a:blip r:embed="rId2">
-            <a:extLst>
-              <a:ext uri="{28A0092B-C50C-407E-A947-70E740481C1C}">
-                <a14:useLocalDpi xmlns:a14="http://schemas.microsoft.com/office/drawing/2010/main" val="0"/>
-              </a:ext>
-            </a:extLst>
-          </a:blip>
-          <a:stretch>
-            <a:fillRect/>
-          </a:stretch>
-        </p:blipFill>
-        <p:spPr>
-          <a:xfrm>
-            <a:off x="497305" y="779797"/>
-            <a:ext cx="8646695" cy="5975484"/>
-          </a:xfrm>
-          <a:prstGeom prst="rect">
-            <a:avLst/>
-          </a:prstGeom>
-        </p:spPr>
-      </p:pic>
+            <a:endParaRPr lang="en-GB" dirty="0"/>
+          </a:p>
+        </p:txBody>
+      </p:sp>
     </p:spTree>
     <p:extLst>
       <p:ext uri="{BB962C8B-B14F-4D97-AF65-F5344CB8AC3E}">
-        <p14:creationId xmlns:p14="http://schemas.microsoft.com/office/powerpoint/2010/main" val="4166845283"/>
+        <p14:creationId xmlns:p14="http://schemas.microsoft.com/office/powerpoint/2010/main" val="2737371758"/>
       </p:ext>
     </p:extLst>
   </p:cSld>
@@ -11236,10 +11928,10 @@
       </p:grpSpPr>
       <p:sp>
         <p:nvSpPr>
-          <p:cNvPr id="2" name="Datumsplatzhalter 1">
+          <p:cNvPr id="2" name="Titel 1">
             <a:extLst>
               <a:ext uri="{FF2B5EF4-FFF2-40B4-BE49-F238E27FC236}">
-                <a16:creationId xmlns:a16="http://schemas.microsoft.com/office/drawing/2014/main" id="{26FF4413-2C50-4255-A5D7-47E7DAE7F47F}"/>
+                <a16:creationId xmlns:a16="http://schemas.microsoft.com/office/drawing/2014/main" id="{2707FF40-2067-4CCE-9B11-A0813C2139A5}"/>
               </a:ext>
             </a:extLst>
           </p:cNvPr>
@@ -11247,7 +11939,7 @@
             <a:spLocks noGrp="1"/>
           </p:cNvSpPr>
           <p:nvPr>
-            <p:ph type="dt" sz="half" idx="10"/>
+            <p:ph type="title"/>
           </p:nvPr>
         </p:nvSpPr>
         <p:spPr/>
@@ -11255,20 +11947,24 @@
           <a:bodyPr/>
           <a:lstStyle/>
           <a:p>
-            <a:fld id="{7A054B8C-EECC-4C6F-BCD4-949C60E889BC}" type="datetime1">
-              <a:rPr lang="de-AT" smtClean="0"/>
-              <a:t>15.11.2017</a:t>
-            </a:fld>
-            <a:endParaRPr lang="en-GB"/>
-          </a:p>
-        </p:txBody>
-      </p:sp>
-      <p:sp>
-        <p:nvSpPr>
-          <p:cNvPr id="3" name="Fußzeilenplatzhalter 2">
+            <a:r>
+              <a:rPr lang="de-AT" dirty="0" err="1"/>
+              <a:t>Example</a:t>
+            </a:r>
+            <a:r>
+              <a:rPr lang="de-AT" dirty="0"/>
+              <a:t> </a:t>
+            </a:r>
+            <a:endParaRPr lang="en-GB" dirty="0"/>
+          </a:p>
+        </p:txBody>
+      </p:sp>
+      <p:sp>
+        <p:nvSpPr>
+          <p:cNvPr id="3" name="Textplatzhalter 2">
             <a:extLst>
               <a:ext uri="{FF2B5EF4-FFF2-40B4-BE49-F238E27FC236}">
-                <a16:creationId xmlns:a16="http://schemas.microsoft.com/office/drawing/2014/main" id="{FDA3809B-9939-467B-B7A9-B49C2A99DB5C}"/>
+                <a16:creationId xmlns:a16="http://schemas.microsoft.com/office/drawing/2014/main" id="{8BDCEA06-9F17-446B-95B4-E4865F9FF231}"/>
               </a:ext>
             </a:extLst>
           </p:cNvPr>
@@ -11276,7 +11972,7 @@
             <a:spLocks noGrp="1"/>
           </p:cNvSpPr>
           <p:nvPr>
-            <p:ph type="ftr" sz="quarter" idx="11"/>
+            <p:ph type="body" idx="1"/>
           </p:nvPr>
         </p:nvSpPr>
         <p:spPr/>
@@ -11284,6 +11980,60 @@
           <a:bodyPr/>
           <a:lstStyle/>
           <a:p>
+            <a:endParaRPr lang="en-GB" dirty="0"/>
+          </a:p>
+        </p:txBody>
+      </p:sp>
+      <p:sp>
+        <p:nvSpPr>
+          <p:cNvPr id="4" name="Datumsplatzhalter 3">
+            <a:extLst>
+              <a:ext uri="{FF2B5EF4-FFF2-40B4-BE49-F238E27FC236}">
+                <a16:creationId xmlns:a16="http://schemas.microsoft.com/office/drawing/2014/main" id="{DC1BD6ED-E1BE-48CC-8221-09E032B045DF}"/>
+              </a:ext>
+            </a:extLst>
+          </p:cNvPr>
+          <p:cNvSpPr>
+            <a:spLocks noGrp="1"/>
+          </p:cNvSpPr>
+          <p:nvPr>
+            <p:ph type="dt" sz="half" idx="10"/>
+          </p:nvPr>
+        </p:nvSpPr>
+        <p:spPr/>
+        <p:txBody>
+          <a:bodyPr/>
+          <a:lstStyle/>
+          <a:p>
+            <a:fld id="{CA35A274-A62A-42B4-BD58-C44215261C59}" type="datetime1">
+              <a:rPr lang="de-AT" smtClean="0"/>
+              <a:t>19.11.2017</a:t>
+            </a:fld>
+            <a:endParaRPr lang="en-GB" dirty="0"/>
+          </a:p>
+        </p:txBody>
+      </p:sp>
+      <p:sp>
+        <p:nvSpPr>
+          <p:cNvPr id="5" name="Fußzeilenplatzhalter 4">
+            <a:extLst>
+              <a:ext uri="{FF2B5EF4-FFF2-40B4-BE49-F238E27FC236}">
+                <a16:creationId xmlns:a16="http://schemas.microsoft.com/office/drawing/2014/main" id="{3B058CD1-9BDE-48ED-A335-07190BD510A9}"/>
+              </a:ext>
+            </a:extLst>
+          </p:cNvPr>
+          <p:cNvSpPr>
+            <a:spLocks noGrp="1"/>
+          </p:cNvSpPr>
+          <p:nvPr>
+            <p:ph type="ftr" sz="quarter" idx="11"/>
+          </p:nvPr>
+        </p:nvSpPr>
+        <p:spPr/>
+        <p:txBody>
+          <a:bodyPr/>
+          <a:lstStyle/>
+          <a:p>
             <a:r>
               <a:rPr lang="en-GB"/>
               <a:t>SEW</a:t>
@@ -11293,10 +12043,10 @@
       </p:sp>
       <p:sp>
         <p:nvSpPr>
-          <p:cNvPr id="4" name="Foliennummernplatzhalter 3">
+          <p:cNvPr id="6" name="Foliennummernplatzhalter 5">
             <a:extLst>
               <a:ext uri="{FF2B5EF4-FFF2-40B4-BE49-F238E27FC236}">
-                <a16:creationId xmlns:a16="http://schemas.microsoft.com/office/drawing/2014/main" id="{88268E5C-8EE5-4F02-AFC1-EB7545300D3C}"/>
+                <a16:creationId xmlns:a16="http://schemas.microsoft.com/office/drawing/2014/main" id="{D3CFDB94-7A48-4908-A64C-ED1FAEB185BC}"/>
               </a:ext>
             </a:extLst>
           </p:cNvPr>
@@ -11320,82 +12070,10 @@
           </a:p>
         </p:txBody>
       </p:sp>
-      <p:pic>
-        <p:nvPicPr>
-          <p:cNvPr id="6" name="Grafik 5">
-            <a:extLst>
-              <a:ext uri="{FF2B5EF4-FFF2-40B4-BE49-F238E27FC236}">
-                <a16:creationId xmlns:a16="http://schemas.microsoft.com/office/drawing/2014/main" id="{01A8E062-3AE3-4B4F-B9D8-4F8249EA94D2}"/>
-              </a:ext>
-            </a:extLst>
-          </p:cNvPr>
-          <p:cNvPicPr>
-            <a:picLocks noChangeAspect="1"/>
-          </p:cNvPicPr>
-          <p:nvPr/>
-        </p:nvPicPr>
-        <p:blipFill>
-          <a:blip r:embed="rId2">
-            <a:extLst>
-              <a:ext uri="{28A0092B-C50C-407E-A947-70E740481C1C}">
-                <a14:useLocalDpi xmlns:a14="http://schemas.microsoft.com/office/drawing/2010/main" val="0"/>
-              </a:ext>
-            </a:extLst>
-          </a:blip>
-          <a:stretch>
-            <a:fillRect/>
-          </a:stretch>
-        </p:blipFill>
-        <p:spPr>
-          <a:xfrm>
-            <a:off x="453231" y="1031596"/>
-            <a:ext cx="5846572" cy="1223332"/>
-          </a:xfrm>
-          <a:prstGeom prst="rect">
-            <a:avLst/>
-          </a:prstGeom>
-        </p:spPr>
-      </p:pic>
-      <p:pic>
-        <p:nvPicPr>
-          <p:cNvPr id="8" name="Grafik 7">
-            <a:extLst>
-              <a:ext uri="{FF2B5EF4-FFF2-40B4-BE49-F238E27FC236}">
-                <a16:creationId xmlns:a16="http://schemas.microsoft.com/office/drawing/2014/main" id="{490AC1E0-9B25-4484-9D44-9527196B55FC}"/>
-              </a:ext>
-            </a:extLst>
-          </p:cNvPr>
-          <p:cNvPicPr>
-            <a:picLocks noChangeAspect="1"/>
-          </p:cNvPicPr>
-          <p:nvPr/>
-        </p:nvPicPr>
-        <p:blipFill>
-          <a:blip r:embed="rId3">
-            <a:extLst>
-              <a:ext uri="{28A0092B-C50C-407E-A947-70E740481C1C}">
-                <a14:useLocalDpi xmlns:a14="http://schemas.microsoft.com/office/drawing/2010/main" val="0"/>
-              </a:ext>
-            </a:extLst>
-          </a:blip>
-          <a:stretch>
-            <a:fillRect/>
-          </a:stretch>
-        </p:blipFill>
-        <p:spPr>
-          <a:xfrm>
-            <a:off x="453231" y="2918224"/>
-            <a:ext cx="5743715" cy="1662654"/>
-          </a:xfrm>
-          <a:prstGeom prst="rect">
-            <a:avLst/>
-          </a:prstGeom>
-        </p:spPr>
-      </p:pic>
     </p:spTree>
     <p:extLst>
       <p:ext uri="{BB962C8B-B14F-4D97-AF65-F5344CB8AC3E}">
-        <p14:creationId xmlns:p14="http://schemas.microsoft.com/office/powerpoint/2010/main" val="1951865263"/>
+        <p14:creationId xmlns:p14="http://schemas.microsoft.com/office/powerpoint/2010/main" val="2300021862"/>
       </p:ext>
     </p:extLst>
   </p:cSld>
@@ -11424,10 +12102,10 @@
       </p:grpSpPr>
       <p:sp>
         <p:nvSpPr>
-          <p:cNvPr id="2" name="Datumsplatzhalter 1">
+          <p:cNvPr id="7" name="Titel 6">
             <a:extLst>
               <a:ext uri="{FF2B5EF4-FFF2-40B4-BE49-F238E27FC236}">
-                <a16:creationId xmlns:a16="http://schemas.microsoft.com/office/drawing/2014/main" id="{79B2999A-1A2E-4FD2-9470-741C9B7C0FF3}"/>
+                <a16:creationId xmlns:a16="http://schemas.microsoft.com/office/drawing/2014/main" id="{C65ADE24-03A3-4738-87F5-D487E0CFD7A7}"/>
               </a:ext>
             </a:extLst>
           </p:cNvPr>
@@ -11435,7 +12113,7 @@
             <a:spLocks noGrp="1"/>
           </p:cNvSpPr>
           <p:nvPr>
-            <p:ph type="dt" sz="half" idx="10"/>
+            <p:ph type="title"/>
           </p:nvPr>
         </p:nvSpPr>
         <p:spPr/>
@@ -11443,20 +12121,16 @@
           <a:bodyPr/>
           <a:lstStyle/>
           <a:p>
-            <a:fld id="{7A054B8C-EECC-4C6F-BCD4-949C60E889BC}" type="datetime1">
-              <a:rPr lang="de-AT" smtClean="0"/>
-              <a:t>15.11.2017</a:t>
-            </a:fld>
-            <a:endParaRPr lang="en-GB"/>
-          </a:p>
-        </p:txBody>
-      </p:sp>
-      <p:sp>
-        <p:nvSpPr>
-          <p:cNvPr id="3" name="Fußzeilenplatzhalter 2">
+            <a:endParaRPr lang="en-GB" dirty="0"/>
+          </a:p>
+        </p:txBody>
+      </p:sp>
+      <p:sp>
+        <p:nvSpPr>
+          <p:cNvPr id="8" name="Inhaltsplatzhalter 7">
             <a:extLst>
               <a:ext uri="{FF2B5EF4-FFF2-40B4-BE49-F238E27FC236}">
-                <a16:creationId xmlns:a16="http://schemas.microsoft.com/office/drawing/2014/main" id="{78E552F8-6608-4A92-852B-B860859284D7}"/>
+                <a16:creationId xmlns:a16="http://schemas.microsoft.com/office/drawing/2014/main" id="{C11950B7-B6A0-4133-AE1E-7EF5EA458188}"/>
               </a:ext>
             </a:extLst>
           </p:cNvPr>
@@ -11464,7 +12138,7 @@
             <a:spLocks noGrp="1"/>
           </p:cNvSpPr>
           <p:nvPr>
-            <p:ph type="ftr" sz="quarter" idx="11"/>
+            <p:ph idx="1"/>
           </p:nvPr>
         </p:nvSpPr>
         <p:spPr/>
@@ -11473,6 +12147,71 @@
           <a:lstStyle/>
           <a:p>
             <a:r>
+              <a:rPr lang="en-GB" dirty="0"/>
+              <a:t>an Audio Player which can play mp3 files only wants to use an advanced audio player which can play </a:t>
+            </a:r>
+            <a:r>
+              <a:rPr lang="en-GB" dirty="0" err="1"/>
+              <a:t>vlc</a:t>
+            </a:r>
+            <a:r>
+              <a:rPr lang="en-GB" dirty="0"/>
+              <a:t> and mp4 files</a:t>
+            </a:r>
+          </a:p>
+        </p:txBody>
+      </p:sp>
+      <p:sp>
+        <p:nvSpPr>
+          <p:cNvPr id="4" name="Datumsplatzhalter 3">
+            <a:extLst>
+              <a:ext uri="{FF2B5EF4-FFF2-40B4-BE49-F238E27FC236}">
+                <a16:creationId xmlns:a16="http://schemas.microsoft.com/office/drawing/2014/main" id="{C4D2CD01-D47B-47DA-BD54-0F4BF487AE4F}"/>
+              </a:ext>
+            </a:extLst>
+          </p:cNvPr>
+          <p:cNvSpPr>
+            <a:spLocks noGrp="1"/>
+          </p:cNvSpPr>
+          <p:nvPr>
+            <p:ph type="dt" sz="half" idx="10"/>
+          </p:nvPr>
+        </p:nvSpPr>
+        <p:spPr/>
+        <p:txBody>
+          <a:bodyPr/>
+          <a:lstStyle/>
+          <a:p>
+            <a:fld id="{71E33593-A42C-4932-9C8F-FFDF3EC0AE31}" type="datetime1">
+              <a:rPr lang="de-AT" smtClean="0"/>
+              <a:t>19.11.2017</a:t>
+            </a:fld>
+            <a:endParaRPr lang="en-GB"/>
+          </a:p>
+        </p:txBody>
+      </p:sp>
+      <p:sp>
+        <p:nvSpPr>
+          <p:cNvPr id="5" name="Fußzeilenplatzhalter 4">
+            <a:extLst>
+              <a:ext uri="{FF2B5EF4-FFF2-40B4-BE49-F238E27FC236}">
+                <a16:creationId xmlns:a16="http://schemas.microsoft.com/office/drawing/2014/main" id="{14A79B3D-7CB5-496C-9200-94BB5FD38FF2}"/>
+              </a:ext>
+            </a:extLst>
+          </p:cNvPr>
+          <p:cNvSpPr>
+            <a:spLocks noGrp="1"/>
+          </p:cNvSpPr>
+          <p:nvPr>
+            <p:ph type="ftr" sz="quarter" idx="11"/>
+          </p:nvPr>
+        </p:nvSpPr>
+        <p:spPr/>
+        <p:txBody>
+          <a:bodyPr/>
+          <a:lstStyle/>
+          <a:p>
+            <a:r>
               <a:rPr lang="en-GB"/>
               <a:t>SEW</a:t>
             </a:r>
@@ -11481,10 +12220,10 @@
       </p:sp>
       <p:sp>
         <p:nvSpPr>
-          <p:cNvPr id="4" name="Foliennummernplatzhalter 3">
+          <p:cNvPr id="6" name="Foliennummernplatzhalter 5">
             <a:extLst>
               <a:ext uri="{FF2B5EF4-FFF2-40B4-BE49-F238E27FC236}">
-                <a16:creationId xmlns:a16="http://schemas.microsoft.com/office/drawing/2014/main" id="{E967A4EC-AE48-47BB-AF34-BC35F759C225}"/>
+                <a16:creationId xmlns:a16="http://schemas.microsoft.com/office/drawing/2014/main" id="{5C35E209-E9C9-4835-8945-0C965A2DCA8B}"/>
               </a:ext>
             </a:extLst>
           </p:cNvPr>
@@ -11508,46 +12247,10 @@
           </a:p>
         </p:txBody>
       </p:sp>
-      <p:pic>
-        <p:nvPicPr>
-          <p:cNvPr id="6" name="Grafik 5">
-            <a:extLst>
-              <a:ext uri="{FF2B5EF4-FFF2-40B4-BE49-F238E27FC236}">
-                <a16:creationId xmlns:a16="http://schemas.microsoft.com/office/drawing/2014/main" id="{9D0E2FCE-65BD-47BE-BDFC-0FEA3AE86231}"/>
-              </a:ext>
-            </a:extLst>
-          </p:cNvPr>
-          <p:cNvPicPr>
-            <a:picLocks noChangeAspect="1"/>
-          </p:cNvPicPr>
-          <p:nvPr/>
-        </p:nvPicPr>
-        <p:blipFill>
-          <a:blip r:embed="rId2">
-            <a:extLst>
-              <a:ext uri="{28A0092B-C50C-407E-A947-70E740481C1C}">
-                <a14:useLocalDpi xmlns:a14="http://schemas.microsoft.com/office/drawing/2010/main" val="0"/>
-              </a:ext>
-            </a:extLst>
-          </a:blip>
-          <a:stretch>
-            <a:fillRect/>
-          </a:stretch>
-        </p:blipFill>
-        <p:spPr>
-          <a:xfrm>
-            <a:off x="651604" y="1063924"/>
-            <a:ext cx="6256392" cy="5230344"/>
-          </a:xfrm>
-          <a:prstGeom prst="rect">
-            <a:avLst/>
-          </a:prstGeom>
-        </p:spPr>
-      </p:pic>
     </p:spTree>
     <p:extLst>
       <p:ext uri="{BB962C8B-B14F-4D97-AF65-F5344CB8AC3E}">
-        <p14:creationId xmlns:p14="http://schemas.microsoft.com/office/powerpoint/2010/main" val="4009876560"/>
+        <p14:creationId xmlns:p14="http://schemas.microsoft.com/office/powerpoint/2010/main" val="3650476640"/>
       </p:ext>
     </p:extLst>
   </p:cSld>

</xml_diff>